<commit_message>
v1.5.0: Renaming to MDRO-Report, and added ST-Type, vanA and vanB to all
</commit_message>
<xml_diff>
--- a/images/Grafik ETL MDreport.pptx
+++ b/images/Grafik ETL MDreport.pptx
@@ -6,6 +6,7 @@
   </p:sldMasterIdLst>
   <p:sldIdLst>
     <p:sldId id="256" r:id="rId2"/>
+    <p:sldId id="257" r:id="rId3"/>
   </p:sldIdLst>
   <p:sldSz cx="12192000" cy="6858000"/>
   <p:notesSz cx="6858000" cy="9144000"/>
@@ -243,7 +244,7 @@
           <a:p>
             <a:fld id="{25EB1AC2-4150-407C-A9A0-54E0CF37BB12}" type="datetimeFigureOut">
               <a:rPr lang="de-DE" smtClean="0"/>
-              <a:t>01.04.2022</a:t>
+              <a:t>30.08.2023</a:t>
             </a:fld>
             <a:endParaRPr lang="de-DE"/>
           </a:p>
@@ -413,7 +414,7 @@
           <a:p>
             <a:fld id="{25EB1AC2-4150-407C-A9A0-54E0CF37BB12}" type="datetimeFigureOut">
               <a:rPr lang="de-DE" smtClean="0"/>
-              <a:t>01.04.2022</a:t>
+              <a:t>30.08.2023</a:t>
             </a:fld>
             <a:endParaRPr lang="de-DE"/>
           </a:p>
@@ -593,7 +594,7 @@
           <a:p>
             <a:fld id="{25EB1AC2-4150-407C-A9A0-54E0CF37BB12}" type="datetimeFigureOut">
               <a:rPr lang="de-DE" smtClean="0"/>
-              <a:t>01.04.2022</a:t>
+              <a:t>30.08.2023</a:t>
             </a:fld>
             <a:endParaRPr lang="de-DE"/>
           </a:p>
@@ -763,7 +764,7 @@
           <a:p>
             <a:fld id="{25EB1AC2-4150-407C-A9A0-54E0CF37BB12}" type="datetimeFigureOut">
               <a:rPr lang="de-DE" smtClean="0"/>
-              <a:t>01.04.2022</a:t>
+              <a:t>30.08.2023</a:t>
             </a:fld>
             <a:endParaRPr lang="de-DE"/>
           </a:p>
@@ -1009,7 +1010,7 @@
           <a:p>
             <a:fld id="{25EB1AC2-4150-407C-A9A0-54E0CF37BB12}" type="datetimeFigureOut">
               <a:rPr lang="de-DE" smtClean="0"/>
-              <a:t>01.04.2022</a:t>
+              <a:t>30.08.2023</a:t>
             </a:fld>
             <a:endParaRPr lang="de-DE"/>
           </a:p>
@@ -1241,7 +1242,7 @@
           <a:p>
             <a:fld id="{25EB1AC2-4150-407C-A9A0-54E0CF37BB12}" type="datetimeFigureOut">
               <a:rPr lang="de-DE" smtClean="0"/>
-              <a:t>01.04.2022</a:t>
+              <a:t>30.08.2023</a:t>
             </a:fld>
             <a:endParaRPr lang="de-DE"/>
           </a:p>
@@ -1608,7 +1609,7 @@
           <a:p>
             <a:fld id="{25EB1AC2-4150-407C-A9A0-54E0CF37BB12}" type="datetimeFigureOut">
               <a:rPr lang="de-DE" smtClean="0"/>
-              <a:t>01.04.2022</a:t>
+              <a:t>30.08.2023</a:t>
             </a:fld>
             <a:endParaRPr lang="de-DE"/>
           </a:p>
@@ -1726,7 +1727,7 @@
           <a:p>
             <a:fld id="{25EB1AC2-4150-407C-A9A0-54E0CF37BB12}" type="datetimeFigureOut">
               <a:rPr lang="de-DE" smtClean="0"/>
-              <a:t>01.04.2022</a:t>
+              <a:t>30.08.2023</a:t>
             </a:fld>
             <a:endParaRPr lang="de-DE"/>
           </a:p>
@@ -1821,7 +1822,7 @@
           <a:p>
             <a:fld id="{25EB1AC2-4150-407C-A9A0-54E0CF37BB12}" type="datetimeFigureOut">
               <a:rPr lang="de-DE" smtClean="0"/>
-              <a:t>01.04.2022</a:t>
+              <a:t>30.08.2023</a:t>
             </a:fld>
             <a:endParaRPr lang="de-DE"/>
           </a:p>
@@ -2098,7 +2099,7 @@
           <a:p>
             <a:fld id="{25EB1AC2-4150-407C-A9A0-54E0CF37BB12}" type="datetimeFigureOut">
               <a:rPr lang="de-DE" smtClean="0"/>
-              <a:t>01.04.2022</a:t>
+              <a:t>30.08.2023</a:t>
             </a:fld>
             <a:endParaRPr lang="de-DE"/>
           </a:p>
@@ -2351,7 +2352,7 @@
           <a:p>
             <a:fld id="{25EB1AC2-4150-407C-A9A0-54E0CF37BB12}" type="datetimeFigureOut">
               <a:rPr lang="de-DE" smtClean="0"/>
-              <a:t>01.04.2022</a:t>
+              <a:t>30.08.2023</a:t>
             </a:fld>
             <a:endParaRPr lang="de-DE"/>
           </a:p>
@@ -2564,7 +2565,7 @@
           <a:p>
             <a:fld id="{25EB1AC2-4150-407C-A9A0-54E0CF37BB12}" type="datetimeFigureOut">
               <a:rPr lang="de-DE" smtClean="0"/>
-              <a:t>01.04.2022</a:t>
+              <a:t>30.08.2023</a:t>
             </a:fld>
             <a:endParaRPr lang="de-DE"/>
           </a:p>
@@ -3834,6 +3835,918 @@
 </p:sld>
 </file>
 
+<file path=ppt/slides/slide2.xml><?xml version="1.0" encoding="utf-8"?>
+<p:sld xmlns:a="http://schemas.openxmlformats.org/drawingml/2006/main" xmlns:r="http://schemas.openxmlformats.org/officeDocument/2006/relationships" xmlns:p="http://schemas.openxmlformats.org/presentationml/2006/main">
+  <p:cSld>
+    <p:spTree>
+      <p:nvGrpSpPr>
+        <p:cNvPr id="1" name=""/>
+        <p:cNvGrpSpPr/>
+        <p:nvPr/>
+      </p:nvGrpSpPr>
+      <p:grpSpPr>
+        <a:xfrm>
+          <a:off x="0" y="0"/>
+          <a:ext cx="0" cy="0"/>
+          <a:chOff x="0" y="0"/>
+          <a:chExt cx="0" cy="0"/>
+        </a:xfrm>
+      </p:grpSpPr>
+      <p:sp>
+        <p:nvSpPr>
+          <p:cNvPr id="4" name="Rechteck 3"/>
+          <p:cNvSpPr/>
+          <p:nvPr/>
+        </p:nvSpPr>
+        <p:spPr>
+          <a:xfrm>
+            <a:off x="3346622" y="1486815"/>
+            <a:ext cx="2553729" cy="864973"/>
+          </a:xfrm>
+          <a:prstGeom prst="rect">
+            <a:avLst/>
+          </a:prstGeom>
+        </p:spPr>
+        <p:style>
+          <a:lnRef idx="2">
+            <a:schemeClr val="accent5">
+              <a:shade val="50000"/>
+            </a:schemeClr>
+          </a:lnRef>
+          <a:fillRef idx="1">
+            <a:schemeClr val="accent5"/>
+          </a:fillRef>
+          <a:effectRef idx="0">
+            <a:schemeClr val="accent5"/>
+          </a:effectRef>
+          <a:fontRef idx="minor">
+            <a:schemeClr val="lt1"/>
+          </a:fontRef>
+        </p:style>
+        <p:txBody>
+          <a:bodyPr rtlCol="0" anchor="ctr"/>
+          <a:lstStyle/>
+          <a:p>
+            <a:pPr algn="ctr"/>
+            <a:r>
+              <a:rPr lang="de-DE" dirty="0" smtClean="0"/>
+              <a:t>ORBIS</a:t>
+            </a:r>
+            <a:br>
+              <a:rPr lang="de-DE" dirty="0" smtClean="0"/>
+            </a:br>
+            <a:r>
+              <a:rPr lang="de-DE" sz="1400" dirty="0" err="1" smtClean="0"/>
+              <a:t>hospital</a:t>
+            </a:r>
+            <a:r>
+              <a:rPr lang="de-DE" sz="1400" dirty="0" smtClean="0"/>
+              <a:t> </a:t>
+            </a:r>
+            <a:r>
+              <a:rPr lang="de-DE" sz="1400" dirty="0" err="1" smtClean="0"/>
+              <a:t>information</a:t>
+            </a:r>
+            <a:r>
+              <a:rPr lang="de-DE" sz="1400" dirty="0" smtClean="0"/>
+              <a:t> </a:t>
+            </a:r>
+            <a:r>
+              <a:rPr lang="de-DE" sz="1400" dirty="0" err="1" smtClean="0"/>
+              <a:t>system</a:t>
+            </a:r>
+            <a:endParaRPr lang="de-DE" dirty="0"/>
+          </a:p>
+        </p:txBody>
+      </p:sp>
+      <p:sp>
+        <p:nvSpPr>
+          <p:cNvPr id="5" name="Rechteck 4"/>
+          <p:cNvSpPr/>
+          <p:nvPr/>
+        </p:nvSpPr>
+        <p:spPr>
+          <a:xfrm>
+            <a:off x="3346622" y="3072599"/>
+            <a:ext cx="2553729" cy="864973"/>
+          </a:xfrm>
+          <a:prstGeom prst="rect">
+            <a:avLst/>
+          </a:prstGeom>
+        </p:spPr>
+        <p:style>
+          <a:lnRef idx="2">
+            <a:schemeClr val="accent5">
+              <a:shade val="50000"/>
+            </a:schemeClr>
+          </a:lnRef>
+          <a:fillRef idx="1">
+            <a:schemeClr val="accent5"/>
+          </a:fillRef>
+          <a:effectRef idx="0">
+            <a:schemeClr val="accent5"/>
+          </a:effectRef>
+          <a:fontRef idx="minor">
+            <a:schemeClr val="lt1"/>
+          </a:fontRef>
+        </p:style>
+        <p:txBody>
+          <a:bodyPr rtlCol="0" anchor="ctr"/>
+          <a:lstStyle/>
+          <a:p>
+            <a:pPr algn="ctr"/>
+            <a:r>
+              <a:rPr lang="de-DE" dirty="0" smtClean="0"/>
+              <a:t>Opus-L</a:t>
+            </a:r>
+            <a:br>
+              <a:rPr lang="de-DE" dirty="0" smtClean="0"/>
+            </a:br>
+            <a:r>
+              <a:rPr lang="de-DE" sz="1400" dirty="0" err="1" smtClean="0"/>
+              <a:t>l</a:t>
+            </a:r>
+            <a:r>
+              <a:rPr lang="de-DE" sz="1400" dirty="0" err="1" smtClean="0"/>
+              <a:t>aboratory</a:t>
+            </a:r>
+            <a:r>
+              <a:rPr lang="de-DE" sz="1400" dirty="0" smtClean="0"/>
+              <a:t> </a:t>
+            </a:r>
+            <a:r>
+              <a:rPr lang="de-DE" sz="1400" dirty="0" err="1"/>
+              <a:t>information</a:t>
+            </a:r>
+            <a:r>
+              <a:rPr lang="de-DE" sz="1400" dirty="0"/>
+              <a:t> </a:t>
+            </a:r>
+            <a:r>
+              <a:rPr lang="de-DE" sz="1400" dirty="0" err="1"/>
+              <a:t>management</a:t>
+            </a:r>
+            <a:r>
+              <a:rPr lang="de-DE" sz="1400" dirty="0"/>
+              <a:t> </a:t>
+            </a:r>
+            <a:r>
+              <a:rPr lang="de-DE" sz="1400" dirty="0" err="1"/>
+              <a:t>system</a:t>
+            </a:r>
+            <a:endParaRPr lang="de-DE" dirty="0"/>
+          </a:p>
+        </p:txBody>
+      </p:sp>
+      <p:sp>
+        <p:nvSpPr>
+          <p:cNvPr id="6" name="Rechteck 5"/>
+          <p:cNvSpPr/>
+          <p:nvPr/>
+        </p:nvSpPr>
+        <p:spPr>
+          <a:xfrm>
+            <a:off x="3346621" y="4658383"/>
+            <a:ext cx="2553729" cy="864973"/>
+          </a:xfrm>
+          <a:prstGeom prst="rect">
+            <a:avLst/>
+          </a:prstGeom>
+        </p:spPr>
+        <p:style>
+          <a:lnRef idx="2">
+            <a:schemeClr val="accent5">
+              <a:shade val="50000"/>
+            </a:schemeClr>
+          </a:lnRef>
+          <a:fillRef idx="1">
+            <a:schemeClr val="accent5"/>
+          </a:fillRef>
+          <a:effectRef idx="0">
+            <a:schemeClr val="accent5"/>
+          </a:effectRef>
+          <a:fontRef idx="minor">
+            <a:schemeClr val="lt1"/>
+          </a:fontRef>
+        </p:style>
+        <p:txBody>
+          <a:bodyPr rtlCol="0" anchor="ctr"/>
+          <a:lstStyle/>
+          <a:p>
+            <a:pPr algn="ctr"/>
+            <a:r>
+              <a:rPr lang="de-DE" dirty="0" err="1" smtClean="0"/>
+              <a:t>SeqSphere</a:t>
+            </a:r>
+            <a:r>
+              <a:rPr lang="de-DE" dirty="0" smtClean="0"/>
+              <a:t>+</a:t>
+            </a:r>
+            <a:r>
+              <a:rPr lang="de-DE" dirty="0" smtClean="0"/>
+              <a:t/>
+            </a:r>
+            <a:br>
+              <a:rPr lang="de-DE" dirty="0" smtClean="0"/>
+            </a:br>
+            <a:r>
+              <a:rPr lang="de-DE" sz="1400" dirty="0" err="1" smtClean="0"/>
+              <a:t>m</a:t>
+            </a:r>
+            <a:r>
+              <a:rPr lang="de-DE" sz="1400" dirty="0" err="1" smtClean="0"/>
+              <a:t>icrobial</a:t>
+            </a:r>
+            <a:r>
+              <a:rPr lang="de-DE" sz="1400" dirty="0" smtClean="0"/>
+              <a:t> </a:t>
+            </a:r>
+            <a:r>
+              <a:rPr lang="de-DE" sz="1400" dirty="0" err="1"/>
+              <a:t>genomics</a:t>
+            </a:r>
+            <a:r>
+              <a:rPr lang="de-DE" sz="1400" dirty="0"/>
+              <a:t> </a:t>
+            </a:r>
+            <a:r>
+              <a:rPr lang="de-DE" sz="1400" dirty="0" err="1"/>
+              <a:t>software</a:t>
+            </a:r>
+            <a:endParaRPr lang="de-DE" dirty="0"/>
+          </a:p>
+        </p:txBody>
+      </p:sp>
+      <p:sp>
+        <p:nvSpPr>
+          <p:cNvPr id="7" name="Rechteck 6"/>
+          <p:cNvSpPr/>
+          <p:nvPr/>
+        </p:nvSpPr>
+        <p:spPr>
+          <a:xfrm>
+            <a:off x="7656156" y="3072599"/>
+            <a:ext cx="2553729" cy="864973"/>
+          </a:xfrm>
+          <a:prstGeom prst="rect">
+            <a:avLst/>
+          </a:prstGeom>
+        </p:spPr>
+        <p:style>
+          <a:lnRef idx="2">
+            <a:schemeClr val="accent5">
+              <a:shade val="50000"/>
+            </a:schemeClr>
+          </a:lnRef>
+          <a:fillRef idx="1">
+            <a:schemeClr val="accent5"/>
+          </a:fillRef>
+          <a:effectRef idx="0">
+            <a:schemeClr val="accent5"/>
+          </a:effectRef>
+          <a:fontRef idx="minor">
+            <a:schemeClr val="lt1"/>
+          </a:fontRef>
+        </p:style>
+        <p:txBody>
+          <a:bodyPr rtlCol="0" anchor="ctr"/>
+          <a:lstStyle/>
+          <a:p>
+            <a:pPr algn="ctr"/>
+            <a:r>
+              <a:rPr lang="de-DE" dirty="0" err="1" smtClean="0"/>
+              <a:t>BaseX</a:t>
+            </a:r>
+            <a:r>
+              <a:rPr lang="de-DE" dirty="0" smtClean="0"/>
+              <a:t/>
+            </a:r>
+            <a:br>
+              <a:rPr lang="de-DE" dirty="0" smtClean="0"/>
+            </a:br>
+            <a:r>
+              <a:rPr lang="de-DE" sz="1400" dirty="0" err="1" smtClean="0"/>
+              <a:t>Datalake</a:t>
+            </a:r>
+            <a:endParaRPr lang="de-DE" dirty="0"/>
+          </a:p>
+        </p:txBody>
+      </p:sp>
+      <p:sp>
+        <p:nvSpPr>
+          <p:cNvPr id="9" name="Rechteck 8"/>
+          <p:cNvSpPr/>
+          <p:nvPr/>
+        </p:nvSpPr>
+        <p:spPr>
+          <a:xfrm>
+            <a:off x="12468398" y="1436015"/>
+            <a:ext cx="2553729" cy="864973"/>
+          </a:xfrm>
+          <a:prstGeom prst="rect">
+            <a:avLst/>
+          </a:prstGeom>
+          <a:ln/>
+        </p:spPr>
+        <p:style>
+          <a:lnRef idx="2">
+            <a:schemeClr val="accent5">
+              <a:shade val="50000"/>
+            </a:schemeClr>
+          </a:lnRef>
+          <a:fillRef idx="1">
+            <a:schemeClr val="accent5"/>
+          </a:fillRef>
+          <a:effectRef idx="0">
+            <a:schemeClr val="accent5"/>
+          </a:effectRef>
+          <a:fontRef idx="minor">
+            <a:schemeClr val="lt1"/>
+          </a:fontRef>
+        </p:style>
+        <p:txBody>
+          <a:bodyPr rtlCol="0" anchor="ctr"/>
+          <a:lstStyle/>
+          <a:p>
+            <a:pPr algn="ctr"/>
+            <a:r>
+              <a:rPr lang="de-DE" dirty="0" smtClean="0"/>
+              <a:t>HL7 FHIR</a:t>
+            </a:r>
+            <a:br>
+              <a:rPr lang="de-DE" dirty="0" smtClean="0"/>
+            </a:br>
+            <a:r>
+              <a:rPr lang="de-DE" sz="1400" dirty="0" smtClean="0"/>
+              <a:t>MII Kerndatensatz, GECCO</a:t>
+            </a:r>
+            <a:endParaRPr lang="de-DE" sz="1400" dirty="0"/>
+          </a:p>
+        </p:txBody>
+      </p:sp>
+      <p:sp>
+        <p:nvSpPr>
+          <p:cNvPr id="10" name="Rechteck 9"/>
+          <p:cNvSpPr/>
+          <p:nvPr/>
+        </p:nvSpPr>
+        <p:spPr>
+          <a:xfrm>
+            <a:off x="12468397" y="3937572"/>
+            <a:ext cx="2553729" cy="864973"/>
+          </a:xfrm>
+          <a:prstGeom prst="rect">
+            <a:avLst/>
+          </a:prstGeom>
+          <a:ln/>
+        </p:spPr>
+        <p:style>
+          <a:lnRef idx="2">
+            <a:schemeClr val="accent5">
+              <a:shade val="50000"/>
+            </a:schemeClr>
+          </a:lnRef>
+          <a:fillRef idx="1">
+            <a:schemeClr val="accent5"/>
+          </a:fillRef>
+          <a:effectRef idx="0">
+            <a:schemeClr val="accent5"/>
+          </a:effectRef>
+          <a:fontRef idx="minor">
+            <a:schemeClr val="lt1"/>
+          </a:fontRef>
+        </p:style>
+        <p:txBody>
+          <a:bodyPr rtlCol="0" anchor="ctr"/>
+          <a:lstStyle/>
+          <a:p>
+            <a:pPr algn="ctr"/>
+            <a:r>
+              <a:rPr lang="de-DE" dirty="0" err="1" smtClean="0"/>
+              <a:t>openEHR</a:t>
+            </a:r>
+            <a:endParaRPr lang="de-DE" dirty="0"/>
+          </a:p>
+        </p:txBody>
+      </p:sp>
+      <p:sp>
+        <p:nvSpPr>
+          <p:cNvPr id="11" name="Rechteck 10"/>
+          <p:cNvSpPr/>
+          <p:nvPr/>
+        </p:nvSpPr>
+        <p:spPr>
+          <a:xfrm>
+            <a:off x="7656156" y="4653580"/>
+            <a:ext cx="2553729" cy="864973"/>
+          </a:xfrm>
+          <a:prstGeom prst="rect">
+            <a:avLst/>
+          </a:prstGeom>
+        </p:spPr>
+        <p:style>
+          <a:lnRef idx="2">
+            <a:schemeClr val="accent5">
+              <a:shade val="50000"/>
+            </a:schemeClr>
+          </a:lnRef>
+          <a:fillRef idx="1">
+            <a:schemeClr val="accent5"/>
+          </a:fillRef>
+          <a:effectRef idx="0">
+            <a:schemeClr val="accent5"/>
+          </a:effectRef>
+          <a:fontRef idx="minor">
+            <a:schemeClr val="lt1"/>
+          </a:fontRef>
+        </p:style>
+        <p:txBody>
+          <a:bodyPr rtlCol="0" anchor="ctr"/>
+          <a:lstStyle/>
+          <a:p>
+            <a:pPr algn="ctr"/>
+            <a:r>
+              <a:rPr lang="de-DE" dirty="0" err="1" smtClean="0"/>
+              <a:t>MREReport</a:t>
+            </a:r>
+            <a:endParaRPr lang="de-DE" dirty="0"/>
+          </a:p>
+        </p:txBody>
+      </p:sp>
+      <p:cxnSp>
+        <p:nvCxnSpPr>
+          <p:cNvPr id="13" name="Gerade Verbindung mit Pfeil 12"/>
+          <p:cNvCxnSpPr>
+            <a:stCxn id="4" idx="3"/>
+          </p:cNvCxnSpPr>
+          <p:nvPr/>
+        </p:nvCxnSpPr>
+        <p:spPr>
+          <a:xfrm>
+            <a:off x="5900351" y="1919302"/>
+            <a:ext cx="1755805" cy="1148494"/>
+          </a:xfrm>
+          <a:prstGeom prst="straightConnector1">
+            <a:avLst/>
+          </a:prstGeom>
+          <a:ln>
+            <a:tailEnd type="triangle"/>
+          </a:ln>
+        </p:spPr>
+        <p:style>
+          <a:lnRef idx="2">
+            <a:schemeClr val="accent5">
+              <a:shade val="50000"/>
+            </a:schemeClr>
+          </a:lnRef>
+          <a:fillRef idx="1">
+            <a:schemeClr val="accent5"/>
+          </a:fillRef>
+          <a:effectRef idx="0">
+            <a:schemeClr val="accent5"/>
+          </a:effectRef>
+          <a:fontRef idx="minor">
+            <a:schemeClr val="lt1"/>
+          </a:fontRef>
+        </p:style>
+      </p:cxnSp>
+      <p:cxnSp>
+        <p:nvCxnSpPr>
+          <p:cNvPr id="15" name="Gerade Verbindung mit Pfeil 14"/>
+          <p:cNvCxnSpPr>
+            <a:stCxn id="5" idx="3"/>
+            <a:endCxn id="7" idx="1"/>
+          </p:cNvCxnSpPr>
+          <p:nvPr/>
+        </p:nvCxnSpPr>
+        <p:spPr>
+          <a:xfrm>
+            <a:off x="5900351" y="3505086"/>
+            <a:ext cx="1755805" cy="0"/>
+          </a:xfrm>
+          <a:prstGeom prst="straightConnector1">
+            <a:avLst/>
+          </a:prstGeom>
+          <a:ln>
+            <a:tailEnd type="triangle"/>
+          </a:ln>
+        </p:spPr>
+        <p:style>
+          <a:lnRef idx="2">
+            <a:schemeClr val="accent5">
+              <a:shade val="50000"/>
+            </a:schemeClr>
+          </a:lnRef>
+          <a:fillRef idx="1">
+            <a:schemeClr val="accent5"/>
+          </a:fillRef>
+          <a:effectRef idx="0">
+            <a:schemeClr val="accent5"/>
+          </a:effectRef>
+          <a:fontRef idx="minor">
+            <a:schemeClr val="lt1"/>
+          </a:fontRef>
+        </p:style>
+      </p:cxnSp>
+      <p:cxnSp>
+        <p:nvCxnSpPr>
+          <p:cNvPr id="17" name="Gerade Verbindung mit Pfeil 16"/>
+          <p:cNvCxnSpPr>
+            <a:stCxn id="6" idx="3"/>
+          </p:cNvCxnSpPr>
+          <p:nvPr/>
+        </p:nvCxnSpPr>
+        <p:spPr>
+          <a:xfrm flipV="1">
+            <a:off x="5900350" y="3937572"/>
+            <a:ext cx="1755806" cy="1153298"/>
+          </a:xfrm>
+          <a:prstGeom prst="straightConnector1">
+            <a:avLst/>
+          </a:prstGeom>
+          <a:ln>
+            <a:tailEnd type="triangle"/>
+          </a:ln>
+        </p:spPr>
+        <p:style>
+          <a:lnRef idx="2">
+            <a:schemeClr val="accent5">
+              <a:shade val="50000"/>
+            </a:schemeClr>
+          </a:lnRef>
+          <a:fillRef idx="1">
+            <a:schemeClr val="accent5"/>
+          </a:fillRef>
+          <a:effectRef idx="0">
+            <a:schemeClr val="accent5"/>
+          </a:effectRef>
+          <a:fontRef idx="minor">
+            <a:schemeClr val="lt1"/>
+          </a:fontRef>
+        </p:style>
+      </p:cxnSp>
+      <p:cxnSp>
+        <p:nvCxnSpPr>
+          <p:cNvPr id="19" name="Gerade Verbindung mit Pfeil 18"/>
+          <p:cNvCxnSpPr>
+            <a:stCxn id="7" idx="2"/>
+            <a:endCxn id="11" idx="0"/>
+          </p:cNvCxnSpPr>
+          <p:nvPr/>
+        </p:nvCxnSpPr>
+        <p:spPr>
+          <a:xfrm>
+            <a:off x="8933021" y="3937572"/>
+            <a:ext cx="0" cy="716008"/>
+          </a:xfrm>
+          <a:prstGeom prst="straightConnector1">
+            <a:avLst/>
+          </a:prstGeom>
+          <a:ln>
+            <a:tailEnd type="triangle"/>
+          </a:ln>
+        </p:spPr>
+        <p:style>
+          <a:lnRef idx="2">
+            <a:schemeClr val="accent5">
+              <a:shade val="50000"/>
+            </a:schemeClr>
+          </a:lnRef>
+          <a:fillRef idx="1">
+            <a:schemeClr val="accent5"/>
+          </a:fillRef>
+          <a:effectRef idx="0">
+            <a:schemeClr val="accent5"/>
+          </a:effectRef>
+          <a:fontRef idx="minor">
+            <a:schemeClr val="lt1"/>
+          </a:fontRef>
+        </p:style>
+      </p:cxnSp>
+      <p:sp>
+        <p:nvSpPr>
+          <p:cNvPr id="2" name="Rechteck 1"/>
+          <p:cNvSpPr/>
+          <p:nvPr/>
+        </p:nvSpPr>
+        <p:spPr>
+          <a:xfrm>
+            <a:off x="1689271" y="1560755"/>
+            <a:ext cx="1657350" cy="275710"/>
+          </a:xfrm>
+          <a:prstGeom prst="rect">
+            <a:avLst/>
+          </a:prstGeom>
+        </p:spPr>
+        <p:style>
+          <a:lnRef idx="2">
+            <a:schemeClr val="accent1">
+              <a:shade val="50000"/>
+            </a:schemeClr>
+          </a:lnRef>
+          <a:fillRef idx="1">
+            <a:schemeClr val="accent1"/>
+          </a:fillRef>
+          <a:effectRef idx="0">
+            <a:schemeClr val="accent1"/>
+          </a:effectRef>
+          <a:fontRef idx="minor">
+            <a:schemeClr val="lt1"/>
+          </a:fontRef>
+        </p:style>
+        <p:txBody>
+          <a:bodyPr rtlCol="0" anchor="ctr"/>
+          <a:lstStyle/>
+          <a:p>
+            <a:pPr algn="ctr"/>
+            <a:r>
+              <a:rPr lang="de-DE" dirty="0" err="1" smtClean="0"/>
+              <a:t>patient</a:t>
+            </a:r>
+            <a:r>
+              <a:rPr lang="de-DE" dirty="0" smtClean="0"/>
+              <a:t> </a:t>
+            </a:r>
+            <a:r>
+              <a:rPr lang="de-DE" dirty="0" err="1" smtClean="0"/>
+              <a:t>days</a:t>
+            </a:r>
+            <a:endParaRPr lang="de-DE" dirty="0"/>
+          </a:p>
+        </p:txBody>
+      </p:sp>
+      <p:sp>
+        <p:nvSpPr>
+          <p:cNvPr id="16" name="Rechteck 15"/>
+          <p:cNvSpPr/>
+          <p:nvPr/>
+        </p:nvSpPr>
+        <p:spPr>
+          <a:xfrm>
+            <a:off x="1689271" y="3134153"/>
+            <a:ext cx="1657350" cy="275710"/>
+          </a:xfrm>
+          <a:prstGeom prst="rect">
+            <a:avLst/>
+          </a:prstGeom>
+        </p:spPr>
+        <p:style>
+          <a:lnRef idx="2">
+            <a:schemeClr val="accent1">
+              <a:shade val="50000"/>
+            </a:schemeClr>
+          </a:lnRef>
+          <a:fillRef idx="1">
+            <a:schemeClr val="accent1"/>
+          </a:fillRef>
+          <a:effectRef idx="0">
+            <a:schemeClr val="accent1"/>
+          </a:effectRef>
+          <a:fontRef idx="minor">
+            <a:schemeClr val="lt1"/>
+          </a:fontRef>
+        </p:style>
+        <p:txBody>
+          <a:bodyPr rtlCol="0" anchor="ctr"/>
+          <a:lstStyle/>
+          <a:p>
+            <a:pPr algn="ctr"/>
+            <a:r>
+              <a:rPr lang="de-DE" dirty="0"/>
+              <a:t>p</a:t>
+            </a:r>
+            <a:r>
+              <a:rPr lang="de-DE" dirty="0" smtClean="0"/>
+              <a:t>athogen </a:t>
+            </a:r>
+            <a:r>
+              <a:rPr lang="de-DE" dirty="0" err="1" smtClean="0"/>
+              <a:t>types</a:t>
+            </a:r>
+            <a:endParaRPr lang="de-DE" dirty="0"/>
+          </a:p>
+        </p:txBody>
+      </p:sp>
+      <p:sp>
+        <p:nvSpPr>
+          <p:cNvPr id="18" name="Rechteck 17"/>
+          <p:cNvSpPr/>
+          <p:nvPr/>
+        </p:nvSpPr>
+        <p:spPr>
+          <a:xfrm>
+            <a:off x="1689271" y="1954149"/>
+            <a:ext cx="1657350" cy="275710"/>
+          </a:xfrm>
+          <a:prstGeom prst="rect">
+            <a:avLst/>
+          </a:prstGeom>
+        </p:spPr>
+        <p:style>
+          <a:lnRef idx="2">
+            <a:schemeClr val="accent1">
+              <a:shade val="50000"/>
+            </a:schemeClr>
+          </a:lnRef>
+          <a:fillRef idx="1">
+            <a:schemeClr val="accent1"/>
+          </a:fillRef>
+          <a:effectRef idx="0">
+            <a:schemeClr val="accent1"/>
+          </a:effectRef>
+          <a:fontRef idx="minor">
+            <a:schemeClr val="lt1"/>
+          </a:fontRef>
+        </p:style>
+        <p:txBody>
+          <a:bodyPr rtlCol="0" anchor="ctr"/>
+          <a:lstStyle/>
+          <a:p>
+            <a:pPr algn="ctr"/>
+            <a:r>
+              <a:rPr lang="de-DE" dirty="0" err="1" smtClean="0"/>
+              <a:t>patient</a:t>
+            </a:r>
+            <a:r>
+              <a:rPr lang="de-DE" dirty="0" smtClean="0"/>
+              <a:t> </a:t>
+            </a:r>
+            <a:r>
+              <a:rPr lang="de-DE" dirty="0" err="1" smtClean="0"/>
+              <a:t>location</a:t>
+            </a:r>
+            <a:endParaRPr lang="de-DE" dirty="0"/>
+          </a:p>
+        </p:txBody>
+      </p:sp>
+      <p:sp>
+        <p:nvSpPr>
+          <p:cNvPr id="20" name="Rechteck 19"/>
+          <p:cNvSpPr/>
+          <p:nvPr/>
+        </p:nvSpPr>
+        <p:spPr>
+          <a:xfrm>
+            <a:off x="1689271" y="3548363"/>
+            <a:ext cx="1657350" cy="275710"/>
+          </a:xfrm>
+          <a:prstGeom prst="rect">
+            <a:avLst/>
+          </a:prstGeom>
+        </p:spPr>
+        <p:style>
+          <a:lnRef idx="2">
+            <a:schemeClr val="accent1">
+              <a:shade val="50000"/>
+            </a:schemeClr>
+          </a:lnRef>
+          <a:fillRef idx="1">
+            <a:schemeClr val="accent1"/>
+          </a:fillRef>
+          <a:effectRef idx="0">
+            <a:schemeClr val="accent1"/>
+          </a:effectRef>
+          <a:fontRef idx="minor">
+            <a:schemeClr val="lt1"/>
+          </a:fontRef>
+        </p:style>
+        <p:txBody>
+          <a:bodyPr rtlCol="0" anchor="ctr"/>
+          <a:lstStyle/>
+          <a:p>
+            <a:pPr algn="ctr"/>
+            <a:r>
+              <a:rPr lang="de-DE" dirty="0" err="1" smtClean="0"/>
+              <a:t>antibiograms</a:t>
+            </a:r>
+            <a:endParaRPr lang="de-DE" dirty="0"/>
+          </a:p>
+        </p:txBody>
+      </p:sp>
+      <p:sp>
+        <p:nvSpPr>
+          <p:cNvPr id="22" name="Rechteck 21"/>
+          <p:cNvSpPr/>
+          <p:nvPr/>
+        </p:nvSpPr>
+        <p:spPr>
+          <a:xfrm>
+            <a:off x="1689270" y="4719937"/>
+            <a:ext cx="1657350" cy="275710"/>
+          </a:xfrm>
+          <a:prstGeom prst="rect">
+            <a:avLst/>
+          </a:prstGeom>
+        </p:spPr>
+        <p:style>
+          <a:lnRef idx="2">
+            <a:schemeClr val="accent1">
+              <a:shade val="50000"/>
+            </a:schemeClr>
+          </a:lnRef>
+          <a:fillRef idx="1">
+            <a:schemeClr val="accent1"/>
+          </a:fillRef>
+          <a:effectRef idx="0">
+            <a:schemeClr val="accent1"/>
+          </a:effectRef>
+          <a:fontRef idx="minor">
+            <a:schemeClr val="lt1"/>
+          </a:fontRef>
+        </p:style>
+        <p:txBody>
+          <a:bodyPr rtlCol="0" anchor="ctr"/>
+          <a:lstStyle/>
+          <a:p>
+            <a:pPr algn="ctr"/>
+            <a:r>
+              <a:rPr lang="de-DE" dirty="0" err="1" smtClean="0"/>
+              <a:t>spa</a:t>
+            </a:r>
+            <a:r>
+              <a:rPr lang="de-DE" dirty="0" smtClean="0"/>
+              <a:t> t</a:t>
+            </a:r>
+            <a:r>
+              <a:rPr lang="de-DE" dirty="0" smtClean="0"/>
+              <a:t>ype</a:t>
+            </a:r>
+            <a:endParaRPr lang="de-DE" dirty="0"/>
+          </a:p>
+        </p:txBody>
+      </p:sp>
+      <p:sp>
+        <p:nvSpPr>
+          <p:cNvPr id="24" name="Rechteck 23"/>
+          <p:cNvSpPr/>
+          <p:nvPr/>
+        </p:nvSpPr>
+        <p:spPr>
+          <a:xfrm>
+            <a:off x="1689270" y="5134147"/>
+            <a:ext cx="1657350" cy="275710"/>
+          </a:xfrm>
+          <a:prstGeom prst="rect">
+            <a:avLst/>
+          </a:prstGeom>
+        </p:spPr>
+        <p:style>
+          <a:lnRef idx="2">
+            <a:schemeClr val="accent1">
+              <a:shade val="50000"/>
+            </a:schemeClr>
+          </a:lnRef>
+          <a:fillRef idx="1">
+            <a:schemeClr val="accent1"/>
+          </a:fillRef>
+          <a:effectRef idx="0">
+            <a:schemeClr val="accent1"/>
+          </a:effectRef>
+          <a:fontRef idx="minor">
+            <a:schemeClr val="lt1"/>
+          </a:fontRef>
+        </p:style>
+        <p:txBody>
+          <a:bodyPr rtlCol="0" anchor="ctr"/>
+          <a:lstStyle/>
+          <a:p>
+            <a:pPr algn="ctr"/>
+            <a:r>
+              <a:rPr lang="de-DE" dirty="0" err="1"/>
+              <a:t>c</a:t>
+            </a:r>
+            <a:r>
+              <a:rPr lang="de-DE" dirty="0" err="1" smtClean="0"/>
+              <a:t>luster</a:t>
+            </a:r>
+            <a:r>
+              <a:rPr lang="de-DE" dirty="0" smtClean="0"/>
+              <a:t> type</a:t>
+            </a:r>
+            <a:endParaRPr lang="de-DE" dirty="0"/>
+          </a:p>
+        </p:txBody>
+      </p:sp>
+    </p:spTree>
+    <p:extLst>
+      <p:ext uri="{BB962C8B-B14F-4D97-AF65-F5344CB8AC3E}">
+        <p14:creationId xmlns:p14="http://schemas.microsoft.com/office/powerpoint/2010/main" val="1542957057"/>
+      </p:ext>
+    </p:extLst>
+  </p:cSld>
+  <p:clrMapOvr>
+    <a:masterClrMapping/>
+  </p:clrMapOvr>
+  <p:timing>
+    <p:tnLst>
+      <p:par>
+        <p:cTn id="1" dur="indefinite" restart="never" nodeType="tmRoot"/>
+      </p:par>
+    </p:tnLst>
+  </p:timing>
+</p:sld>
+</file>
+
 <file path=ppt/theme/theme1.xml><?xml version="1.0" encoding="utf-8"?>
 <a:theme xmlns:a="http://schemas.openxmlformats.org/drawingml/2006/main" name="Office Theme">
   <a:themeElements>

</xml_diff>